<commit_message>
Added suggestions for slides and things to review
</commit_message>
<xml_diff>
--- a/Bouncer Locking System Midterm Presentation.pptx
+++ b/Bouncer Locking System Midterm Presentation.pptx
@@ -273,7 +273,7 @@
           <a:p>
             <a:fld id="{004C0066-4075-4CF0-BB25-577C2798C6F5}" type="datetimeFigureOut">
               <a:rPr lang="en-US" smtClean="0"/>
-              <a:t>10/8/2021</a:t>
+              <a:t>10/10/2021</a:t>
             </a:fld>
             <a:endParaRPr lang="en-US"/>
           </a:p>
@@ -471,7 +471,7 @@
           <a:p>
             <a:fld id="{004C0066-4075-4CF0-BB25-577C2798C6F5}" type="datetimeFigureOut">
               <a:rPr lang="en-US" smtClean="0"/>
-              <a:t>10/8/2021</a:t>
+              <a:t>10/10/2021</a:t>
             </a:fld>
             <a:endParaRPr lang="en-US"/>
           </a:p>
@@ -679,7 +679,7 @@
           <a:p>
             <a:fld id="{004C0066-4075-4CF0-BB25-577C2798C6F5}" type="datetimeFigureOut">
               <a:rPr lang="en-US" smtClean="0"/>
-              <a:t>10/8/2021</a:t>
+              <a:t>10/10/2021</a:t>
             </a:fld>
             <a:endParaRPr lang="en-US"/>
           </a:p>
@@ -877,7 +877,7 @@
           <a:p>
             <a:fld id="{004C0066-4075-4CF0-BB25-577C2798C6F5}" type="datetimeFigureOut">
               <a:rPr lang="en-US" smtClean="0"/>
-              <a:t>10/8/2021</a:t>
+              <a:t>10/10/2021</a:t>
             </a:fld>
             <a:endParaRPr lang="en-US"/>
           </a:p>
@@ -1152,7 +1152,7 @@
           <a:p>
             <a:fld id="{004C0066-4075-4CF0-BB25-577C2798C6F5}" type="datetimeFigureOut">
               <a:rPr lang="en-US" smtClean="0"/>
-              <a:t>10/8/2021</a:t>
+              <a:t>10/10/2021</a:t>
             </a:fld>
             <a:endParaRPr lang="en-US"/>
           </a:p>
@@ -1417,7 +1417,7 @@
           <a:p>
             <a:fld id="{004C0066-4075-4CF0-BB25-577C2798C6F5}" type="datetimeFigureOut">
               <a:rPr lang="en-US" smtClean="0"/>
-              <a:t>10/8/2021</a:t>
+              <a:t>10/10/2021</a:t>
             </a:fld>
             <a:endParaRPr lang="en-US"/>
           </a:p>
@@ -1829,7 +1829,7 @@
           <a:p>
             <a:fld id="{004C0066-4075-4CF0-BB25-577C2798C6F5}" type="datetimeFigureOut">
               <a:rPr lang="en-US" smtClean="0"/>
-              <a:t>10/8/2021</a:t>
+              <a:t>10/10/2021</a:t>
             </a:fld>
             <a:endParaRPr lang="en-US"/>
           </a:p>
@@ -1970,7 +1970,7 @@
           <a:p>
             <a:fld id="{004C0066-4075-4CF0-BB25-577C2798C6F5}" type="datetimeFigureOut">
               <a:rPr lang="en-US" smtClean="0"/>
-              <a:t>10/8/2021</a:t>
+              <a:t>10/10/2021</a:t>
             </a:fld>
             <a:endParaRPr lang="en-US"/>
           </a:p>
@@ -2083,7 +2083,7 @@
           <a:p>
             <a:fld id="{004C0066-4075-4CF0-BB25-577C2798C6F5}" type="datetimeFigureOut">
               <a:rPr lang="en-US" smtClean="0"/>
-              <a:t>10/8/2021</a:t>
+              <a:t>10/10/2021</a:t>
             </a:fld>
             <a:endParaRPr lang="en-US"/>
           </a:p>
@@ -2394,7 +2394,7 @@
           <a:p>
             <a:fld id="{004C0066-4075-4CF0-BB25-577C2798C6F5}" type="datetimeFigureOut">
               <a:rPr lang="en-US" smtClean="0"/>
-              <a:t>10/8/2021</a:t>
+              <a:t>10/10/2021</a:t>
             </a:fld>
             <a:endParaRPr lang="en-US"/>
           </a:p>
@@ -2682,7 +2682,7 @@
           <a:p>
             <a:fld id="{004C0066-4075-4CF0-BB25-577C2798C6F5}" type="datetimeFigureOut">
               <a:rPr lang="en-US" smtClean="0"/>
-              <a:t>10/8/2021</a:t>
+              <a:t>10/10/2021</a:t>
             </a:fld>
             <a:endParaRPr lang="en-US"/>
           </a:p>
@@ -2923,7 +2923,7 @@
           <a:p>
             <a:fld id="{004C0066-4075-4CF0-BB25-577C2798C6F5}" type="datetimeFigureOut">
               <a:rPr lang="en-US" smtClean="0"/>
-              <a:t>10/8/2021</a:t>
+              <a:t>10/10/2021</a:t>
             </a:fld>
             <a:endParaRPr lang="en-US"/>
           </a:p>
@@ -5602,6 +5602,30 @@
               <a:t>Explain in detail what subsystem you are going to demo first</a:t>
             </a:r>
           </a:p>
+          <a:p>
+            <a:r>
+              <a:rPr lang="en-US" dirty="0"/>
+              <a:t>Ideas:</a:t>
+            </a:r>
+          </a:p>
+          <a:p>
+            <a:pPr lvl="1"/>
+            <a:r>
+              <a:rPr lang="en-US" dirty="0"/>
+              <a:t>Demo camera recording and pushing videos to cloud</a:t>
+            </a:r>
+          </a:p>
+          <a:p>
+            <a:pPr lvl="1"/>
+            <a:r>
+              <a:rPr lang="en-US" dirty="0"/>
+              <a:t>Demo web application pulling videos from cloud</a:t>
+            </a:r>
+          </a:p>
+          <a:p>
+            <a:pPr lvl="1"/>
+            <a:endParaRPr lang="en-US" dirty="0"/>
+          </a:p>
         </p:txBody>
       </p:sp>
     </p:spTree>
@@ -5693,6 +5717,29 @@
               <a:rPr lang="en-US" dirty="0"/>
               <a:t>Has testing caused modifications to design approach?</a:t>
             </a:r>
+          </a:p>
+          <a:p>
+            <a:r>
+              <a:rPr lang="en-US" dirty="0"/>
+              <a:t>Ideas:</a:t>
+            </a:r>
+          </a:p>
+          <a:p>
+            <a:pPr lvl="1"/>
+            <a:r>
+              <a:rPr lang="en-US" dirty="0"/>
+              <a:t>Testing current draw of lock impacted component choices</a:t>
+            </a:r>
+          </a:p>
+          <a:p>
+            <a:pPr lvl="1"/>
+            <a:r>
+              <a:rPr lang="en-US" dirty="0"/>
+              <a:t>Maybe talk about switch from MSP to pi</a:t>
+            </a:r>
+          </a:p>
+          <a:p>
+            <a:endParaRPr lang="en-US" dirty="0"/>
           </a:p>
         </p:txBody>
       </p:sp>

</xml_diff>